<commit_message>
PPT on clean code
</commit_message>
<xml_diff>
--- a/doc/OverView.pptx
+++ b/doc/OverView.pptx
@@ -9,6 +9,8 @@
     <p:sldId id="257" r:id="rId3"/>
     <p:sldId id="258" r:id="rId4"/>
     <p:sldId id="259" r:id="rId5"/>
+    <p:sldId id="260" r:id="rId6"/>
+    <p:sldId id="261" r:id="rId7"/>
   </p:sldIdLst>
   <p:sldSz cx="12192000" cy="6858000"/>
   <p:notesSz cx="6858000" cy="9144000"/>
@@ -107,13 +109,18 @@
       </a:defRPr>
     </a:lvl9pPr>
   </p:defaultTextStyle>
+  <p:extLst>
+    <p:ext uri="{EFAFB233-063F-42B5-8137-9DF3F51BA10A}">
+      <p15:sldGuideLst xmlns:p15="http://schemas.microsoft.com/office/powerpoint/2012/main"/>
+    </p:ext>
+  </p:extLst>
 </p:presentation>
 </file>
 
 <file path=ppt/revisionInfo.xml><?xml version="1.0" encoding="utf-8"?>
 <p1510:revInfo xmlns:a="http://schemas.openxmlformats.org/drawingml/2006/main" xmlns:r="http://schemas.openxmlformats.org/officeDocument/2006/relationships" xmlns:p1510="http://schemas.microsoft.com/office/powerpoint/2015/10/main">
   <p1510:revLst>
-    <p1510:client id="{F9F550E8-8AE9-4781-BB39-BA2A27E2B59A}" v="17" dt="2024-11-13T04:24:24.964"/>
+    <p1510:client id="{F9F550E8-8AE9-4781-BB39-BA2A27E2B59A}" v="24" dt="2024-11-14T03:39:58.637"/>
   </p1510:revLst>
 </p1510:revInfo>
 </file>
@@ -123,7 +130,7 @@
   <pc:docChgLst>
     <pc:chgData name="Deepak PK Shetty (MS/EBB4-ETAS-VOS)" userId="9603c76f-f852-4601-a329-0cc013fff284" providerId="ADAL" clId="{F9F550E8-8AE9-4781-BB39-BA2A27E2B59A}"/>
     <pc:docChg chg="undo custSel addSld delSld modSld">
-      <pc:chgData name="Deepak PK Shetty (MS/EBB4-ETAS-VOS)" userId="9603c76f-f852-4601-a329-0cc013fff284" providerId="ADAL" clId="{F9F550E8-8AE9-4781-BB39-BA2A27E2B59A}" dt="2024-11-13T05:42:51.806" v="49" actId="6549"/>
+      <pc:chgData name="Deepak PK Shetty (MS/EBB4-ETAS-VOS)" userId="9603c76f-f852-4601-a329-0cc013fff284" providerId="ADAL" clId="{F9F550E8-8AE9-4781-BB39-BA2A27E2B59A}" dt="2024-11-14T03:39:58.636" v="89" actId="1076"/>
       <pc:docMkLst>
         <pc:docMk/>
       </pc:docMkLst>
@@ -231,6 +238,60 @@
             <pc:docMk/>
             <pc:sldMk cId="1022999529" sldId="259"/>
             <ac:spMk id="5" creationId="{F1A1F781-00D1-18A2-FF01-5B7ABA8343B4}"/>
+          </ac:spMkLst>
+        </pc:spChg>
+      </pc:sldChg>
+      <pc:sldChg chg="add">
+        <pc:chgData name="Deepak PK Shetty (MS/EBB4-ETAS-VOS)" userId="9603c76f-f852-4601-a329-0cc013fff284" providerId="ADAL" clId="{F9F550E8-8AE9-4781-BB39-BA2A27E2B59A}" dt="2024-11-13T08:08:55.218" v="50" actId="2890"/>
+        <pc:sldMkLst>
+          <pc:docMk/>
+          <pc:sldMk cId="3507904277" sldId="260"/>
+        </pc:sldMkLst>
+      </pc:sldChg>
+      <pc:sldChg chg="addSp delSp modSp add mod">
+        <pc:chgData name="Deepak PK Shetty (MS/EBB4-ETAS-VOS)" userId="9603c76f-f852-4601-a329-0cc013fff284" providerId="ADAL" clId="{F9F550E8-8AE9-4781-BB39-BA2A27E2B59A}" dt="2024-11-14T03:39:58.636" v="89" actId="1076"/>
+        <pc:sldMkLst>
+          <pc:docMk/>
+          <pc:sldMk cId="1356626027" sldId="261"/>
+        </pc:sldMkLst>
+        <pc:spChg chg="mod">
+          <ac:chgData name="Deepak PK Shetty (MS/EBB4-ETAS-VOS)" userId="9603c76f-f852-4601-a329-0cc013fff284" providerId="ADAL" clId="{F9F550E8-8AE9-4781-BB39-BA2A27E2B59A}" dt="2024-11-14T03:36:25.778" v="60" actId="20577"/>
+          <ac:spMkLst>
+            <pc:docMk/>
+            <pc:sldMk cId="1356626027" sldId="261"/>
+            <ac:spMk id="2" creationId="{0D5E82AD-F9E9-4671-6974-69798A9944ED}"/>
+          </ac:spMkLst>
+        </pc:spChg>
+        <pc:spChg chg="add">
+          <ac:chgData name="Deepak PK Shetty (MS/EBB4-ETAS-VOS)" userId="9603c76f-f852-4601-a329-0cc013fff284" providerId="ADAL" clId="{F9F550E8-8AE9-4781-BB39-BA2A27E2B59A}" dt="2024-11-14T03:37:25.224" v="61"/>
+          <ac:spMkLst>
+            <pc:docMk/>
+            <pc:sldMk cId="1356626027" sldId="261"/>
+            <ac:spMk id="3" creationId="{CA808B68-D121-6E17-2FC4-B1A451EE2211}"/>
+          </ac:spMkLst>
+        </pc:spChg>
+        <pc:spChg chg="add mod">
+          <ac:chgData name="Deepak PK Shetty (MS/EBB4-ETAS-VOS)" userId="9603c76f-f852-4601-a329-0cc013fff284" providerId="ADAL" clId="{F9F550E8-8AE9-4781-BB39-BA2A27E2B59A}" dt="2024-11-14T03:37:52.448" v="64"/>
+          <ac:spMkLst>
+            <pc:docMk/>
+            <pc:sldMk cId="1356626027" sldId="261"/>
+            <ac:spMk id="4" creationId="{38FDE338-B1EB-F8EE-CCC2-821713421B77}"/>
+          </ac:spMkLst>
+        </pc:spChg>
+        <pc:spChg chg="add del mod">
+          <ac:chgData name="Deepak PK Shetty (MS/EBB4-ETAS-VOS)" userId="9603c76f-f852-4601-a329-0cc013fff284" providerId="ADAL" clId="{F9F550E8-8AE9-4781-BB39-BA2A27E2B59A}" dt="2024-11-14T03:37:54.998" v="65"/>
+          <ac:spMkLst>
+            <pc:docMk/>
+            <pc:sldMk cId="1356626027" sldId="261"/>
+            <ac:spMk id="5" creationId="{F1A1F781-00D1-18A2-FF01-5B7ABA8343B4}"/>
+          </ac:spMkLst>
+        </pc:spChg>
+        <pc:spChg chg="add mod">
+          <ac:chgData name="Deepak PK Shetty (MS/EBB4-ETAS-VOS)" userId="9603c76f-f852-4601-a329-0cc013fff284" providerId="ADAL" clId="{F9F550E8-8AE9-4781-BB39-BA2A27E2B59A}" dt="2024-11-14T03:39:58.636" v="89" actId="1076"/>
+          <ac:spMkLst>
+            <pc:docMk/>
+            <pc:sldMk cId="1356626027" sldId="261"/>
+            <ac:spMk id="6" creationId="{C901006B-56DD-7BC4-8F33-C4E74D41D7E6}"/>
           </ac:spMkLst>
         </pc:spChg>
       </pc:sldChg>
@@ -6641,23 +6702,160 @@
                 <a:latin typeface="Arial" panose="020B0604020202020204" pitchFamily="34" charset="0"/>
                 <a:cs typeface="Arial" panose="020B0604020202020204" pitchFamily="34" charset="0"/>
               </a:rPr>
-              <a:t>Example: std::thread, std::mutex, and other concurrency utilities from the C++ Standard Library</a:t>
-            </a:r>
-            <a:r>
-              <a:rPr kumimoji="0" lang="en-US" altLang="en-US" sz="1200" b="0" i="0" u="none" strike="noStrike" cap="none" normalizeH="0" baseline="0">
-                <a:ln>
-                  <a:noFill/>
-                </a:ln>
-                <a:solidFill>
-                  <a:schemeClr val="tx1"/>
-                </a:solidFill>
-                <a:effectLst/>
-                <a:latin typeface="Arial" panose="020B0604020202020204" pitchFamily="34" charset="0"/>
-                <a:cs typeface="Arial" panose="020B0604020202020204" pitchFamily="34" charset="0"/>
-              </a:rPr>
-              <a:t>. </a:t>
-            </a:r>
-            <a:endParaRPr kumimoji="0" lang="en-US" altLang="en-US" sz="1200" b="0" i="0" u="none" strike="noStrike" cap="none" normalizeH="0" baseline="0" dirty="0">
+              <a:t>Example: std::thread, std::mutex, and other concurrency utilities from the C++ Standard Library. </a:t>
+            </a:r>
+          </a:p>
+        </p:txBody>
+      </p:sp>
+    </p:spTree>
+    <p:extLst>
+      <p:ext uri="{BB962C8B-B14F-4D97-AF65-F5344CB8AC3E}">
+        <p14:creationId xmlns:p14="http://schemas.microsoft.com/office/powerpoint/2010/main" val="1022999529"/>
+      </p:ext>
+    </p:extLst>
+  </p:cSld>
+  <p:clrMapOvr>
+    <a:masterClrMapping/>
+  </p:clrMapOvr>
+</p:sld>
+</file>
+
+<file path=ppt/slides/slide5.xml><?xml version="1.0" encoding="utf-8"?>
+<p:sld xmlns:a="http://schemas.openxmlformats.org/drawingml/2006/main" xmlns:r="http://schemas.openxmlformats.org/officeDocument/2006/relationships" xmlns:p="http://schemas.openxmlformats.org/presentationml/2006/main">
+  <p:cSld>
+    <p:spTree>
+      <p:nvGrpSpPr>
+        <p:cNvPr id="1" name=""/>
+        <p:cNvGrpSpPr/>
+        <p:nvPr/>
+      </p:nvGrpSpPr>
+      <p:grpSpPr>
+        <a:xfrm>
+          <a:off x="0" y="0"/>
+          <a:ext cx="0" cy="0"/>
+          <a:chOff x="0" y="0"/>
+          <a:chExt cx="0" cy="0"/>
+        </a:xfrm>
+      </p:grpSpPr>
+      <p:sp>
+        <p:nvSpPr>
+          <p:cNvPr id="2" name="Title 1">
+            <a:extLst>
+              <a:ext uri="{FF2B5EF4-FFF2-40B4-BE49-F238E27FC236}">
+                <a16:creationId xmlns:a16="http://schemas.microsoft.com/office/drawing/2014/main" id="{0D5E82AD-F9E9-4671-6974-69798A9944ED}"/>
+              </a:ext>
+            </a:extLst>
+          </p:cNvPr>
+          <p:cNvSpPr>
+            <a:spLocks noGrp="1"/>
+          </p:cNvSpPr>
+          <p:nvPr>
+            <p:ph type="title"/>
+          </p:nvPr>
+        </p:nvSpPr>
+        <p:spPr>
+          <a:xfrm>
+            <a:off x="838200" y="365125"/>
+            <a:ext cx="10515600" cy="442743"/>
+          </a:xfrm>
+        </p:spPr>
+        <p:txBody>
+          <a:bodyPr>
+            <a:normAutofit fontScale="90000"/>
+          </a:bodyPr>
+          <a:lstStyle/>
+          <a:p>
+            <a:r>
+              <a:rPr lang="en-US" dirty="0"/>
+              <a:t>C++ Programming Paradigms</a:t>
+            </a:r>
+          </a:p>
+        </p:txBody>
+      </p:sp>
+      <p:sp>
+        <p:nvSpPr>
+          <p:cNvPr id="5" name="Rectangle 2">
+            <a:extLst>
+              <a:ext uri="{FF2B5EF4-FFF2-40B4-BE49-F238E27FC236}">
+                <a16:creationId xmlns:a16="http://schemas.microsoft.com/office/drawing/2014/main" id="{F1A1F781-00D1-18A2-FF01-5B7ABA8343B4}"/>
+              </a:ext>
+            </a:extLst>
+          </p:cNvPr>
+          <p:cNvSpPr>
+            <a:spLocks noGrp="1" noChangeArrowheads="1"/>
+          </p:cNvSpPr>
+          <p:nvPr>
+            <p:ph idx="1"/>
+          </p:nvPr>
+        </p:nvSpPr>
+        <p:spPr bwMode="auto">
+          <a:xfrm>
+            <a:off x="926977" y="1177200"/>
+            <a:ext cx="11022367" cy="4739759"/>
+          </a:xfrm>
+          <a:prstGeom prst="rect">
+            <a:avLst/>
+          </a:prstGeom>
+          <a:noFill/>
+          <a:ln>
+            <a:noFill/>
+          </a:ln>
+          <a:effectLst/>
+          <a:extLst>
+            <a:ext uri="{909E8E84-426E-40DD-AFC4-6F175D3DCCD1}">
+              <a14:hiddenFill xmlns:a14="http://schemas.microsoft.com/office/drawing/2010/main">
+                <a:solidFill>
+                  <a:schemeClr val="accent1"/>
+                </a:solidFill>
+              </a14:hiddenFill>
+            </a:ext>
+            <a:ext uri="{91240B29-F687-4F45-9708-019B960494DF}">
+              <a14:hiddenLine xmlns:a14="http://schemas.microsoft.com/office/drawing/2010/main" w="9525">
+                <a:solidFill>
+                  <a:schemeClr val="tx1"/>
+                </a:solidFill>
+                <a:miter lim="800000"/>
+                <a:headEnd/>
+                <a:tailEnd/>
+              </a14:hiddenLine>
+            </a:ext>
+            <a:ext uri="{AF507438-7753-43E0-B8FC-AC1667EBCBE1}">
+              <a14:hiddenEffects xmlns:a14="http://schemas.microsoft.com/office/drawing/2010/main">
+                <a:effectLst>
+                  <a:outerShdw dist="35921" dir="2700000" algn="ctr" rotWithShape="0">
+                    <a:schemeClr val="bg2"/>
+                  </a:outerShdw>
+                </a:effectLst>
+              </a14:hiddenEffects>
+            </a:ext>
+          </a:extLst>
+        </p:spPr>
+        <p:txBody>
+          <a:bodyPr vert="horz" wrap="square" lIns="91440" tIns="45720" rIns="91440" bIns="45720" numCol="1" anchor="ctr" anchorCtr="0" compatLnSpc="1">
+            <a:prstTxWarp prst="textNoShape">
+              <a:avLst/>
+            </a:prstTxWarp>
+            <a:spAutoFit/>
+          </a:bodyPr>
+          <a:lstStyle/>
+          <a:p>
+            <a:pPr marL="0" marR="0" lvl="0" indent="0" algn="l" defTabSz="914400" rtl="0" eaLnBrk="0" fontAlgn="base" latinLnBrk="0" hangingPunct="0">
+              <a:lnSpc>
+                <a:spcPct val="100000"/>
+              </a:lnSpc>
+              <a:spcBef>
+                <a:spcPct val="0"/>
+              </a:spcBef>
+              <a:spcAft>
+                <a:spcPct val="0"/>
+              </a:spcAft>
+              <a:buClrTx/>
+              <a:buSzTx/>
+              <a:buFontTx/>
+              <a:buNone/>
+              <a:tabLst/>
+            </a:pPr>
+            <a:endParaRPr kumimoji="0" lang="en-US" altLang="en-US" sz="1400" b="0" i="0" u="none" strike="noStrike" cap="none" normalizeH="0" baseline="0" dirty="0">
               <a:ln>
                 <a:noFill/>
               </a:ln>
@@ -6666,15 +6864,1614 @@
               </a:solidFill>
               <a:effectLst/>
               <a:latin typeface="Arial" panose="020B0604020202020204" pitchFamily="34" charset="0"/>
-              <a:cs typeface="Arial" panose="020B0604020202020204" pitchFamily="34" charset="0"/>
             </a:endParaRPr>
+          </a:p>
+          <a:p>
+            <a:pPr marL="0" marR="0" lvl="0" indent="0" algn="l" defTabSz="914400" rtl="0" eaLnBrk="0" fontAlgn="base" latinLnBrk="0" hangingPunct="0">
+              <a:lnSpc>
+                <a:spcPct val="100000"/>
+              </a:lnSpc>
+              <a:spcBef>
+                <a:spcPct val="0"/>
+              </a:spcBef>
+              <a:spcAft>
+                <a:spcPct val="0"/>
+              </a:spcAft>
+              <a:buClrTx/>
+              <a:buSzTx/>
+              <a:buFontTx/>
+              <a:buAutoNum type="arabicPeriod"/>
+              <a:tabLst/>
+            </a:pPr>
+            <a:r>
+              <a:rPr kumimoji="0" lang="en-US" altLang="en-US" sz="1200" b="1" i="0" u="none" strike="noStrike" cap="none" normalizeH="0" baseline="0" dirty="0">
+                <a:ln>
+                  <a:noFill/>
+                </a:ln>
+                <a:solidFill>
+                  <a:schemeClr val="tx1"/>
+                </a:solidFill>
+                <a:effectLst/>
+                <a:latin typeface="Arial" panose="020B0604020202020204" pitchFamily="34" charset="0"/>
+                <a:cs typeface="Arial" panose="020B0604020202020204" pitchFamily="34" charset="0"/>
+              </a:rPr>
+              <a:t>Imperative Programming</a:t>
+            </a:r>
+            <a:r>
+              <a:rPr kumimoji="0" lang="en-US" altLang="en-US" sz="1200" b="0" i="0" u="none" strike="noStrike" cap="none" normalizeH="0" baseline="0" dirty="0">
+                <a:ln>
+                  <a:noFill/>
+                </a:ln>
+                <a:solidFill>
+                  <a:schemeClr val="tx1"/>
+                </a:solidFill>
+                <a:effectLst/>
+                <a:latin typeface="Arial" panose="020B0604020202020204" pitchFamily="34" charset="0"/>
+                <a:cs typeface="Arial" panose="020B0604020202020204" pitchFamily="34" charset="0"/>
+              </a:rPr>
+              <a:t>:</a:t>
+            </a:r>
+          </a:p>
+          <a:p>
+            <a:pPr marL="457200" marR="0" lvl="1" indent="0" algn="l" defTabSz="914400" rtl="0" eaLnBrk="0" fontAlgn="base" latinLnBrk="0" hangingPunct="0">
+              <a:lnSpc>
+                <a:spcPct val="100000"/>
+              </a:lnSpc>
+              <a:spcBef>
+                <a:spcPct val="0"/>
+              </a:spcBef>
+              <a:spcAft>
+                <a:spcPct val="0"/>
+              </a:spcAft>
+              <a:buClrTx/>
+              <a:buSzTx/>
+              <a:buFontTx/>
+              <a:buChar char="•"/>
+              <a:tabLst/>
+            </a:pPr>
+            <a:r>
+              <a:rPr kumimoji="0" lang="en-US" altLang="en-US" sz="1200" b="0" i="0" u="none" strike="noStrike" cap="none" normalizeH="0" baseline="0" dirty="0">
+                <a:ln>
+                  <a:noFill/>
+                </a:ln>
+                <a:solidFill>
+                  <a:schemeClr val="tx1"/>
+                </a:solidFill>
+                <a:effectLst/>
+                <a:latin typeface="Arial" panose="020B0604020202020204" pitchFamily="34" charset="0"/>
+                <a:cs typeface="Arial" panose="020B0604020202020204" pitchFamily="34" charset="0"/>
+              </a:rPr>
+              <a:t>Focuses on explicit statements to change the program's state. </a:t>
+            </a:r>
+          </a:p>
+          <a:p>
+            <a:pPr marL="457200" marR="0" lvl="1" indent="0" algn="l" defTabSz="914400" rtl="0" eaLnBrk="0" fontAlgn="base" latinLnBrk="0" hangingPunct="0">
+              <a:lnSpc>
+                <a:spcPct val="100000"/>
+              </a:lnSpc>
+              <a:spcBef>
+                <a:spcPct val="0"/>
+              </a:spcBef>
+              <a:spcAft>
+                <a:spcPct val="0"/>
+              </a:spcAft>
+              <a:buClrTx/>
+              <a:buSzTx/>
+              <a:buFontTx/>
+              <a:buChar char="•"/>
+              <a:tabLst/>
+            </a:pPr>
+            <a:r>
+              <a:rPr kumimoji="0" lang="en-US" altLang="en-US" sz="1200" b="0" i="0" u="none" strike="noStrike" cap="none" normalizeH="0" baseline="0" dirty="0">
+                <a:ln>
+                  <a:noFill/>
+                </a:ln>
+                <a:solidFill>
+                  <a:schemeClr val="tx1"/>
+                </a:solidFill>
+                <a:effectLst/>
+                <a:latin typeface="Arial" panose="020B0604020202020204" pitchFamily="34" charset="0"/>
+                <a:cs typeface="Arial" panose="020B0604020202020204" pitchFamily="34" charset="0"/>
+              </a:rPr>
+              <a:t>Utilizes constructs like loops, conditionals, and assignments. </a:t>
+            </a:r>
+          </a:p>
+          <a:p>
+            <a:pPr marL="457200" marR="0" lvl="1" indent="0" algn="l" defTabSz="914400" rtl="0" eaLnBrk="0" fontAlgn="base" latinLnBrk="0" hangingPunct="0">
+              <a:lnSpc>
+                <a:spcPct val="100000"/>
+              </a:lnSpc>
+              <a:spcBef>
+                <a:spcPct val="0"/>
+              </a:spcBef>
+              <a:spcAft>
+                <a:spcPct val="0"/>
+              </a:spcAft>
+              <a:buClrTx/>
+              <a:buSzTx/>
+              <a:buFontTx/>
+              <a:buChar char="•"/>
+              <a:tabLst/>
+            </a:pPr>
+            <a:r>
+              <a:rPr kumimoji="0" lang="en-US" altLang="en-US" sz="1200" b="0" i="0" u="none" strike="noStrike" cap="none" normalizeH="0" baseline="0" dirty="0">
+                <a:ln>
+                  <a:noFill/>
+                </a:ln>
+                <a:solidFill>
+                  <a:schemeClr val="tx1"/>
+                </a:solidFill>
+                <a:effectLst/>
+                <a:latin typeface="Arial" panose="020B0604020202020204" pitchFamily="34" charset="0"/>
+                <a:cs typeface="Arial" panose="020B0604020202020204" pitchFamily="34" charset="0"/>
+              </a:rPr>
+              <a:t>Example: Basic variable manipulation, control structures. </a:t>
+            </a:r>
+          </a:p>
+          <a:p>
+            <a:pPr marL="0" marR="0" lvl="0" indent="0" algn="l" defTabSz="914400" rtl="0" eaLnBrk="0" fontAlgn="base" latinLnBrk="0" hangingPunct="0">
+              <a:lnSpc>
+                <a:spcPct val="100000"/>
+              </a:lnSpc>
+              <a:spcBef>
+                <a:spcPct val="0"/>
+              </a:spcBef>
+              <a:spcAft>
+                <a:spcPct val="0"/>
+              </a:spcAft>
+              <a:buClrTx/>
+              <a:buSzTx/>
+              <a:buFontTx/>
+              <a:buAutoNum type="arabicPeriod" startAt="2"/>
+              <a:tabLst/>
+            </a:pPr>
+            <a:r>
+              <a:rPr kumimoji="0" lang="en-US" altLang="en-US" sz="1200" b="1" i="0" u="none" strike="noStrike" cap="none" normalizeH="0" baseline="0" dirty="0">
+                <a:ln>
+                  <a:noFill/>
+                </a:ln>
+                <a:solidFill>
+                  <a:schemeClr val="tx1"/>
+                </a:solidFill>
+                <a:effectLst/>
+                <a:latin typeface="Arial" panose="020B0604020202020204" pitchFamily="34" charset="0"/>
+                <a:cs typeface="Arial" panose="020B0604020202020204" pitchFamily="34" charset="0"/>
+              </a:rPr>
+              <a:t>Procedural Programming</a:t>
+            </a:r>
+            <a:r>
+              <a:rPr kumimoji="0" lang="en-US" altLang="en-US" sz="1200" b="0" i="0" u="none" strike="noStrike" cap="none" normalizeH="0" baseline="0" dirty="0">
+                <a:ln>
+                  <a:noFill/>
+                </a:ln>
+                <a:solidFill>
+                  <a:schemeClr val="tx1"/>
+                </a:solidFill>
+                <a:effectLst/>
+                <a:latin typeface="Arial" panose="020B0604020202020204" pitchFamily="34" charset="0"/>
+                <a:cs typeface="Arial" panose="020B0604020202020204" pitchFamily="34" charset="0"/>
+              </a:rPr>
+              <a:t>:</a:t>
+            </a:r>
+          </a:p>
+          <a:p>
+            <a:pPr marL="457200" marR="0" lvl="1" indent="0" algn="l" defTabSz="914400" rtl="0" eaLnBrk="0" fontAlgn="base" latinLnBrk="0" hangingPunct="0">
+              <a:lnSpc>
+                <a:spcPct val="100000"/>
+              </a:lnSpc>
+              <a:spcBef>
+                <a:spcPct val="0"/>
+              </a:spcBef>
+              <a:spcAft>
+                <a:spcPct val="0"/>
+              </a:spcAft>
+              <a:buClrTx/>
+              <a:buSzTx/>
+              <a:buFontTx/>
+              <a:buChar char="•"/>
+              <a:tabLst/>
+            </a:pPr>
+            <a:r>
+              <a:rPr kumimoji="0" lang="en-US" altLang="en-US" sz="1200" b="0" i="0" u="none" strike="noStrike" cap="none" normalizeH="0" baseline="0" dirty="0">
+                <a:ln>
+                  <a:noFill/>
+                </a:ln>
+                <a:solidFill>
+                  <a:schemeClr val="tx1"/>
+                </a:solidFill>
+                <a:effectLst/>
+                <a:latin typeface="Arial" panose="020B0604020202020204" pitchFamily="34" charset="0"/>
+                <a:cs typeface="Arial" panose="020B0604020202020204" pitchFamily="34" charset="0"/>
+              </a:rPr>
+              <a:t>Organizes code into procedures or functions to perform specific tasks. </a:t>
+            </a:r>
+          </a:p>
+          <a:p>
+            <a:pPr marL="457200" marR="0" lvl="1" indent="0" algn="l" defTabSz="914400" rtl="0" eaLnBrk="0" fontAlgn="base" latinLnBrk="0" hangingPunct="0">
+              <a:lnSpc>
+                <a:spcPct val="100000"/>
+              </a:lnSpc>
+              <a:spcBef>
+                <a:spcPct val="0"/>
+              </a:spcBef>
+              <a:spcAft>
+                <a:spcPct val="0"/>
+              </a:spcAft>
+              <a:buClrTx/>
+              <a:buSzTx/>
+              <a:buFontTx/>
+              <a:buChar char="•"/>
+              <a:tabLst/>
+            </a:pPr>
+            <a:r>
+              <a:rPr kumimoji="0" lang="en-US" altLang="en-US" sz="1200" b="0" i="0" u="none" strike="noStrike" cap="none" normalizeH="0" baseline="0" dirty="0">
+                <a:ln>
+                  <a:noFill/>
+                </a:ln>
+                <a:solidFill>
+                  <a:schemeClr val="tx1"/>
+                </a:solidFill>
+                <a:effectLst/>
+                <a:latin typeface="Arial" panose="020B0604020202020204" pitchFamily="34" charset="0"/>
+                <a:cs typeface="Arial" panose="020B0604020202020204" pitchFamily="34" charset="0"/>
+              </a:rPr>
+              <a:t>Promotes code reuse and modularity. </a:t>
+            </a:r>
+          </a:p>
+          <a:p>
+            <a:pPr marL="457200" marR="0" lvl="1" indent="0" algn="l" defTabSz="914400" rtl="0" eaLnBrk="0" fontAlgn="base" latinLnBrk="0" hangingPunct="0">
+              <a:lnSpc>
+                <a:spcPct val="100000"/>
+              </a:lnSpc>
+              <a:spcBef>
+                <a:spcPct val="0"/>
+              </a:spcBef>
+              <a:spcAft>
+                <a:spcPct val="0"/>
+              </a:spcAft>
+              <a:buClrTx/>
+              <a:buSzTx/>
+              <a:buFontTx/>
+              <a:buChar char="•"/>
+              <a:tabLst/>
+            </a:pPr>
+            <a:r>
+              <a:rPr kumimoji="0" lang="en-US" altLang="en-US" sz="1200" b="0" i="0" u="none" strike="noStrike" cap="none" normalizeH="0" baseline="0" dirty="0">
+                <a:ln>
+                  <a:noFill/>
+                </a:ln>
+                <a:solidFill>
+                  <a:schemeClr val="tx1"/>
+                </a:solidFill>
+                <a:effectLst/>
+                <a:latin typeface="Arial" panose="020B0604020202020204" pitchFamily="34" charset="0"/>
+                <a:cs typeface="Arial" panose="020B0604020202020204" pitchFamily="34" charset="0"/>
+              </a:rPr>
+              <a:t>Example: Function definitions and calls. </a:t>
+            </a:r>
+          </a:p>
+          <a:p>
+            <a:pPr marL="0" marR="0" lvl="0" indent="0" algn="l" defTabSz="914400" rtl="0" eaLnBrk="0" fontAlgn="base" latinLnBrk="0" hangingPunct="0">
+              <a:lnSpc>
+                <a:spcPct val="100000"/>
+              </a:lnSpc>
+              <a:spcBef>
+                <a:spcPct val="0"/>
+              </a:spcBef>
+              <a:spcAft>
+                <a:spcPct val="0"/>
+              </a:spcAft>
+              <a:buClrTx/>
+              <a:buSzTx/>
+              <a:buFontTx/>
+              <a:buAutoNum type="arabicPeriod" startAt="3"/>
+              <a:tabLst/>
+            </a:pPr>
+            <a:r>
+              <a:rPr kumimoji="0" lang="en-US" altLang="en-US" sz="1200" b="1" i="0" u="none" strike="noStrike" cap="none" normalizeH="0" baseline="0" dirty="0">
+                <a:ln>
+                  <a:noFill/>
+                </a:ln>
+                <a:solidFill>
+                  <a:schemeClr val="tx1"/>
+                </a:solidFill>
+                <a:effectLst/>
+                <a:latin typeface="Arial" panose="020B0604020202020204" pitchFamily="34" charset="0"/>
+                <a:cs typeface="Arial" panose="020B0604020202020204" pitchFamily="34" charset="0"/>
+              </a:rPr>
+              <a:t>Object-Oriented Programming (OOP)</a:t>
+            </a:r>
+            <a:r>
+              <a:rPr kumimoji="0" lang="en-US" altLang="en-US" sz="1200" b="0" i="0" u="none" strike="noStrike" cap="none" normalizeH="0" baseline="0" dirty="0">
+                <a:ln>
+                  <a:noFill/>
+                </a:ln>
+                <a:solidFill>
+                  <a:schemeClr val="tx1"/>
+                </a:solidFill>
+                <a:effectLst/>
+                <a:latin typeface="Arial" panose="020B0604020202020204" pitchFamily="34" charset="0"/>
+                <a:cs typeface="Arial" panose="020B0604020202020204" pitchFamily="34" charset="0"/>
+              </a:rPr>
+              <a:t>:</a:t>
+            </a:r>
+          </a:p>
+          <a:p>
+            <a:pPr marL="457200" marR="0" lvl="1" indent="0" algn="l" defTabSz="914400" rtl="0" eaLnBrk="0" fontAlgn="base" latinLnBrk="0" hangingPunct="0">
+              <a:lnSpc>
+                <a:spcPct val="100000"/>
+              </a:lnSpc>
+              <a:spcBef>
+                <a:spcPct val="0"/>
+              </a:spcBef>
+              <a:spcAft>
+                <a:spcPct val="0"/>
+              </a:spcAft>
+              <a:buClrTx/>
+              <a:buSzTx/>
+              <a:buFontTx/>
+              <a:buChar char="•"/>
+              <a:tabLst/>
+            </a:pPr>
+            <a:r>
+              <a:rPr kumimoji="0" lang="en-US" altLang="en-US" sz="1200" b="0" i="0" u="none" strike="noStrike" cap="none" normalizeH="0" baseline="0" dirty="0">
+                <a:ln>
+                  <a:noFill/>
+                </a:ln>
+                <a:solidFill>
+                  <a:schemeClr val="tx1"/>
+                </a:solidFill>
+                <a:effectLst/>
+                <a:latin typeface="Arial" panose="020B0604020202020204" pitchFamily="34" charset="0"/>
+                <a:cs typeface="Arial" panose="020B0604020202020204" pitchFamily="34" charset="0"/>
+              </a:rPr>
+              <a:t>Organizes software design around objects that encapsulate data and behavior. </a:t>
+            </a:r>
+          </a:p>
+          <a:p>
+            <a:pPr marL="457200" marR="0" lvl="1" indent="0" algn="l" defTabSz="914400" rtl="0" eaLnBrk="0" fontAlgn="base" latinLnBrk="0" hangingPunct="0">
+              <a:lnSpc>
+                <a:spcPct val="100000"/>
+              </a:lnSpc>
+              <a:spcBef>
+                <a:spcPct val="0"/>
+              </a:spcBef>
+              <a:spcAft>
+                <a:spcPct val="0"/>
+              </a:spcAft>
+              <a:buClrTx/>
+              <a:buSzTx/>
+              <a:buFontTx/>
+              <a:buChar char="•"/>
+              <a:tabLst/>
+            </a:pPr>
+            <a:r>
+              <a:rPr kumimoji="0" lang="en-US" altLang="en-US" sz="1200" b="0" i="0" u="none" strike="noStrike" cap="none" normalizeH="0" baseline="0" dirty="0">
+                <a:ln>
+                  <a:noFill/>
+                </a:ln>
+                <a:solidFill>
+                  <a:schemeClr val="tx1"/>
+                </a:solidFill>
+                <a:effectLst/>
+                <a:latin typeface="Arial" panose="020B0604020202020204" pitchFamily="34" charset="0"/>
+                <a:cs typeface="Arial" panose="020B0604020202020204" pitchFamily="34" charset="0"/>
+              </a:rPr>
+              <a:t>Uses classes and objects, and supports principles like inheritance, polymorphism, encapsulation, and abstraction. </a:t>
+            </a:r>
+          </a:p>
+          <a:p>
+            <a:pPr marL="457200" marR="0" lvl="1" indent="0" algn="l" defTabSz="914400" rtl="0" eaLnBrk="0" fontAlgn="base" latinLnBrk="0" hangingPunct="0">
+              <a:lnSpc>
+                <a:spcPct val="100000"/>
+              </a:lnSpc>
+              <a:spcBef>
+                <a:spcPct val="0"/>
+              </a:spcBef>
+              <a:spcAft>
+                <a:spcPct val="0"/>
+              </a:spcAft>
+              <a:buClrTx/>
+              <a:buSzTx/>
+              <a:buFontTx/>
+              <a:buChar char="•"/>
+              <a:tabLst/>
+            </a:pPr>
+            <a:r>
+              <a:rPr kumimoji="0" lang="en-US" altLang="en-US" sz="1200" b="0" i="0" u="none" strike="noStrike" cap="none" normalizeH="0" baseline="0" dirty="0">
+                <a:ln>
+                  <a:noFill/>
+                </a:ln>
+                <a:solidFill>
+                  <a:schemeClr val="tx1"/>
+                </a:solidFill>
+                <a:effectLst/>
+                <a:latin typeface="Arial" panose="020B0604020202020204" pitchFamily="34" charset="0"/>
+                <a:cs typeface="Arial" panose="020B0604020202020204" pitchFamily="34" charset="0"/>
+              </a:rPr>
+              <a:t>Example: Class definitions, object instantiation, inheritance hierarchies. </a:t>
+            </a:r>
+          </a:p>
+          <a:p>
+            <a:pPr marL="0" marR="0" lvl="0" indent="0" algn="l" defTabSz="914400" rtl="0" eaLnBrk="0" fontAlgn="base" latinLnBrk="0" hangingPunct="0">
+              <a:lnSpc>
+                <a:spcPct val="100000"/>
+              </a:lnSpc>
+              <a:spcBef>
+                <a:spcPct val="0"/>
+              </a:spcBef>
+              <a:spcAft>
+                <a:spcPct val="0"/>
+              </a:spcAft>
+              <a:buClrTx/>
+              <a:buSzTx/>
+              <a:buFontTx/>
+              <a:buAutoNum type="arabicPeriod" startAt="4"/>
+              <a:tabLst/>
+            </a:pPr>
+            <a:r>
+              <a:rPr kumimoji="0" lang="en-US" altLang="en-US" sz="1200" b="1" i="0" u="none" strike="noStrike" cap="none" normalizeH="0" baseline="0" dirty="0">
+                <a:ln>
+                  <a:noFill/>
+                </a:ln>
+                <a:solidFill>
+                  <a:schemeClr val="tx1"/>
+                </a:solidFill>
+                <a:effectLst/>
+                <a:latin typeface="Arial" panose="020B0604020202020204" pitchFamily="34" charset="0"/>
+                <a:cs typeface="Arial" panose="020B0604020202020204" pitchFamily="34" charset="0"/>
+              </a:rPr>
+              <a:t>Generic Programming</a:t>
+            </a:r>
+            <a:r>
+              <a:rPr kumimoji="0" lang="en-US" altLang="en-US" sz="1200" b="0" i="0" u="none" strike="noStrike" cap="none" normalizeH="0" baseline="0" dirty="0">
+                <a:ln>
+                  <a:noFill/>
+                </a:ln>
+                <a:solidFill>
+                  <a:schemeClr val="tx1"/>
+                </a:solidFill>
+                <a:effectLst/>
+                <a:latin typeface="Arial" panose="020B0604020202020204" pitchFamily="34" charset="0"/>
+                <a:cs typeface="Arial" panose="020B0604020202020204" pitchFamily="34" charset="0"/>
+              </a:rPr>
+              <a:t>:</a:t>
+            </a:r>
+          </a:p>
+          <a:p>
+            <a:pPr marL="457200" marR="0" lvl="1" indent="0" algn="l" defTabSz="914400" rtl="0" eaLnBrk="0" fontAlgn="base" latinLnBrk="0" hangingPunct="0">
+              <a:lnSpc>
+                <a:spcPct val="100000"/>
+              </a:lnSpc>
+              <a:spcBef>
+                <a:spcPct val="0"/>
+              </a:spcBef>
+              <a:spcAft>
+                <a:spcPct val="0"/>
+              </a:spcAft>
+              <a:buClrTx/>
+              <a:buSzTx/>
+              <a:buFontTx/>
+              <a:buChar char="•"/>
+              <a:tabLst/>
+            </a:pPr>
+            <a:r>
+              <a:rPr kumimoji="0" lang="en-US" altLang="en-US" sz="1200" b="0" i="0" u="none" strike="noStrike" cap="none" normalizeH="0" baseline="0" dirty="0">
+                <a:ln>
+                  <a:noFill/>
+                </a:ln>
+                <a:solidFill>
+                  <a:schemeClr val="tx1"/>
+                </a:solidFill>
+                <a:effectLst/>
+                <a:latin typeface="Arial" panose="020B0604020202020204" pitchFamily="34" charset="0"/>
+                <a:cs typeface="Arial" panose="020B0604020202020204" pitchFamily="34" charset="0"/>
+              </a:rPr>
+              <a:t>Uses templates to write flexible and reusable code that works with any data type. </a:t>
+            </a:r>
+          </a:p>
+          <a:p>
+            <a:pPr marL="457200" marR="0" lvl="1" indent="0" algn="l" defTabSz="914400" rtl="0" eaLnBrk="0" fontAlgn="base" latinLnBrk="0" hangingPunct="0">
+              <a:lnSpc>
+                <a:spcPct val="100000"/>
+              </a:lnSpc>
+              <a:spcBef>
+                <a:spcPct val="0"/>
+              </a:spcBef>
+              <a:spcAft>
+                <a:spcPct val="0"/>
+              </a:spcAft>
+              <a:buClrTx/>
+              <a:buSzTx/>
+              <a:buFontTx/>
+              <a:buChar char="•"/>
+              <a:tabLst/>
+            </a:pPr>
+            <a:r>
+              <a:rPr kumimoji="0" lang="en-US" altLang="en-US" sz="1200" b="0" i="0" u="none" strike="noStrike" cap="none" normalizeH="0" baseline="0" dirty="0">
+                <a:ln>
+                  <a:noFill/>
+                </a:ln>
+                <a:solidFill>
+                  <a:schemeClr val="tx1"/>
+                </a:solidFill>
+                <a:effectLst/>
+                <a:latin typeface="Arial" panose="020B0604020202020204" pitchFamily="34" charset="0"/>
+                <a:cs typeface="Arial" panose="020B0604020202020204" pitchFamily="34" charset="0"/>
+              </a:rPr>
+              <a:t>Promotes type safety and reduces code duplication. </a:t>
+            </a:r>
+          </a:p>
+          <a:p>
+            <a:pPr marL="457200" marR="0" lvl="1" indent="0" algn="l" defTabSz="914400" rtl="0" eaLnBrk="0" fontAlgn="base" latinLnBrk="0" hangingPunct="0">
+              <a:lnSpc>
+                <a:spcPct val="100000"/>
+              </a:lnSpc>
+              <a:spcBef>
+                <a:spcPct val="0"/>
+              </a:spcBef>
+              <a:spcAft>
+                <a:spcPct val="0"/>
+              </a:spcAft>
+              <a:buClrTx/>
+              <a:buSzTx/>
+              <a:buFontTx/>
+              <a:buChar char="•"/>
+              <a:tabLst/>
+            </a:pPr>
+            <a:r>
+              <a:rPr kumimoji="0" lang="en-US" altLang="en-US" sz="1200" b="0" i="0" u="none" strike="noStrike" cap="none" normalizeH="0" baseline="0" dirty="0">
+                <a:ln>
+                  <a:noFill/>
+                </a:ln>
+                <a:solidFill>
+                  <a:schemeClr val="tx1"/>
+                </a:solidFill>
+                <a:effectLst/>
+                <a:latin typeface="Arial" panose="020B0604020202020204" pitchFamily="34" charset="0"/>
+                <a:cs typeface="Arial" panose="020B0604020202020204" pitchFamily="34" charset="0"/>
+              </a:rPr>
+              <a:t>Example: Template classes and functions. </a:t>
+            </a:r>
+          </a:p>
+          <a:p>
+            <a:pPr marL="0" marR="0" lvl="0" indent="0" algn="l" defTabSz="914400" rtl="0" eaLnBrk="0" fontAlgn="base" latinLnBrk="0" hangingPunct="0">
+              <a:lnSpc>
+                <a:spcPct val="100000"/>
+              </a:lnSpc>
+              <a:spcBef>
+                <a:spcPct val="0"/>
+              </a:spcBef>
+              <a:spcAft>
+                <a:spcPct val="0"/>
+              </a:spcAft>
+              <a:buClrTx/>
+              <a:buSzTx/>
+              <a:buFontTx/>
+              <a:buAutoNum type="arabicPeriod" startAt="5"/>
+              <a:tabLst/>
+            </a:pPr>
+            <a:r>
+              <a:rPr kumimoji="0" lang="en-US" altLang="en-US" sz="1200" b="1" i="0" u="none" strike="noStrike" cap="none" normalizeH="0" baseline="0" dirty="0">
+                <a:ln>
+                  <a:noFill/>
+                </a:ln>
+                <a:solidFill>
+                  <a:schemeClr val="tx1"/>
+                </a:solidFill>
+                <a:effectLst/>
+                <a:latin typeface="Arial" panose="020B0604020202020204" pitchFamily="34" charset="0"/>
+                <a:cs typeface="Arial" panose="020B0604020202020204" pitchFamily="34" charset="0"/>
+              </a:rPr>
+              <a:t>Functional Programming</a:t>
+            </a:r>
+            <a:r>
+              <a:rPr kumimoji="0" lang="en-US" altLang="en-US" sz="1200" b="0" i="0" u="none" strike="noStrike" cap="none" normalizeH="0" baseline="0" dirty="0">
+                <a:ln>
+                  <a:noFill/>
+                </a:ln>
+                <a:solidFill>
+                  <a:schemeClr val="tx1"/>
+                </a:solidFill>
+                <a:effectLst/>
+                <a:latin typeface="Arial" panose="020B0604020202020204" pitchFamily="34" charset="0"/>
+                <a:cs typeface="Arial" panose="020B0604020202020204" pitchFamily="34" charset="0"/>
+              </a:rPr>
+              <a:t>:</a:t>
+            </a:r>
+          </a:p>
+          <a:p>
+            <a:pPr marL="457200" marR="0" lvl="1" indent="0" algn="l" defTabSz="914400" rtl="0" eaLnBrk="0" fontAlgn="base" latinLnBrk="0" hangingPunct="0">
+              <a:lnSpc>
+                <a:spcPct val="100000"/>
+              </a:lnSpc>
+              <a:spcBef>
+                <a:spcPct val="0"/>
+              </a:spcBef>
+              <a:spcAft>
+                <a:spcPct val="0"/>
+              </a:spcAft>
+              <a:buClrTx/>
+              <a:buSzTx/>
+              <a:buFontTx/>
+              <a:buChar char="•"/>
+              <a:tabLst/>
+            </a:pPr>
+            <a:r>
+              <a:rPr kumimoji="0" lang="en-US" altLang="en-US" sz="1200" b="0" i="0" u="none" strike="noStrike" cap="none" normalizeH="0" baseline="0" dirty="0">
+                <a:ln>
+                  <a:noFill/>
+                </a:ln>
+                <a:solidFill>
+                  <a:schemeClr val="tx1"/>
+                </a:solidFill>
+                <a:effectLst/>
+                <a:latin typeface="Arial" panose="020B0604020202020204" pitchFamily="34" charset="0"/>
+                <a:cs typeface="Arial" panose="020B0604020202020204" pitchFamily="34" charset="0"/>
+              </a:rPr>
+              <a:t>Treats computation as the evaluation of mathematical functions and avoids changing state. </a:t>
+            </a:r>
+          </a:p>
+          <a:p>
+            <a:pPr marL="457200" marR="0" lvl="1" indent="0" algn="l" defTabSz="914400" rtl="0" eaLnBrk="0" fontAlgn="base" latinLnBrk="0" hangingPunct="0">
+              <a:lnSpc>
+                <a:spcPct val="100000"/>
+              </a:lnSpc>
+              <a:spcBef>
+                <a:spcPct val="0"/>
+              </a:spcBef>
+              <a:spcAft>
+                <a:spcPct val="0"/>
+              </a:spcAft>
+              <a:buClrTx/>
+              <a:buSzTx/>
+              <a:buFontTx/>
+              <a:buChar char="•"/>
+              <a:tabLst/>
+            </a:pPr>
+            <a:r>
+              <a:rPr kumimoji="0" lang="en-US" altLang="en-US" sz="1200" b="0" i="0" u="none" strike="noStrike" cap="none" normalizeH="0" baseline="0" dirty="0">
+                <a:ln>
+                  <a:noFill/>
+                </a:ln>
+                <a:solidFill>
+                  <a:schemeClr val="tx1"/>
+                </a:solidFill>
+                <a:effectLst/>
+                <a:latin typeface="Arial" panose="020B0604020202020204" pitchFamily="34" charset="0"/>
+                <a:cs typeface="Arial" panose="020B0604020202020204" pitchFamily="34" charset="0"/>
+              </a:rPr>
+              <a:t>Supports features like lambda expressions, higher-order functions, and immutability. </a:t>
+            </a:r>
+          </a:p>
+          <a:p>
+            <a:pPr marL="457200" marR="0" lvl="1" indent="0" algn="l" defTabSz="914400" rtl="0" eaLnBrk="0" fontAlgn="base" latinLnBrk="0" hangingPunct="0">
+              <a:lnSpc>
+                <a:spcPct val="100000"/>
+              </a:lnSpc>
+              <a:spcBef>
+                <a:spcPct val="0"/>
+              </a:spcBef>
+              <a:spcAft>
+                <a:spcPct val="0"/>
+              </a:spcAft>
+              <a:buClrTx/>
+              <a:buSzTx/>
+              <a:buFontTx/>
+              <a:buChar char="•"/>
+              <a:tabLst/>
+            </a:pPr>
+            <a:r>
+              <a:rPr kumimoji="0" lang="en-US" altLang="en-US" sz="1200" b="0" i="0" u="none" strike="noStrike" cap="none" normalizeH="0" baseline="0" dirty="0">
+                <a:ln>
+                  <a:noFill/>
+                </a:ln>
+                <a:solidFill>
+                  <a:schemeClr val="tx1"/>
+                </a:solidFill>
+                <a:effectLst/>
+                <a:latin typeface="Arial" panose="020B0604020202020204" pitchFamily="34" charset="0"/>
+                <a:cs typeface="Arial" panose="020B0604020202020204" pitchFamily="34" charset="0"/>
+              </a:rPr>
+              <a:t>Example: Lambda functions, standard algorithms that take function objects (e.g., std::transform). </a:t>
+            </a:r>
+          </a:p>
+          <a:p>
+            <a:pPr marL="0" marR="0" lvl="0" indent="0" algn="l" defTabSz="914400" rtl="0" eaLnBrk="0" fontAlgn="base" latinLnBrk="0" hangingPunct="0">
+              <a:lnSpc>
+                <a:spcPct val="100000"/>
+              </a:lnSpc>
+              <a:spcBef>
+                <a:spcPct val="0"/>
+              </a:spcBef>
+              <a:spcAft>
+                <a:spcPct val="0"/>
+              </a:spcAft>
+              <a:buClrTx/>
+              <a:buSzTx/>
+              <a:buFontTx/>
+              <a:buAutoNum type="arabicPeriod" startAt="6"/>
+              <a:tabLst/>
+            </a:pPr>
+            <a:r>
+              <a:rPr kumimoji="0" lang="en-US" altLang="en-US" sz="1200" b="1" i="0" u="none" strike="noStrike" cap="none" normalizeH="0" baseline="0" dirty="0">
+                <a:ln>
+                  <a:noFill/>
+                </a:ln>
+                <a:solidFill>
+                  <a:schemeClr val="tx1"/>
+                </a:solidFill>
+                <a:effectLst/>
+                <a:latin typeface="Arial" panose="020B0604020202020204" pitchFamily="34" charset="0"/>
+                <a:cs typeface="Arial" panose="020B0604020202020204" pitchFamily="34" charset="0"/>
+              </a:rPr>
+              <a:t>Concurrent Programming</a:t>
+            </a:r>
+            <a:r>
+              <a:rPr kumimoji="0" lang="en-US" altLang="en-US" sz="1200" b="0" i="0" u="none" strike="noStrike" cap="none" normalizeH="0" baseline="0" dirty="0">
+                <a:ln>
+                  <a:noFill/>
+                </a:ln>
+                <a:solidFill>
+                  <a:schemeClr val="tx1"/>
+                </a:solidFill>
+                <a:effectLst/>
+                <a:latin typeface="Arial" panose="020B0604020202020204" pitchFamily="34" charset="0"/>
+                <a:cs typeface="Arial" panose="020B0604020202020204" pitchFamily="34" charset="0"/>
+              </a:rPr>
+              <a:t>:</a:t>
+            </a:r>
+          </a:p>
+          <a:p>
+            <a:pPr marL="457200" marR="0" lvl="1" indent="0" algn="l" defTabSz="914400" rtl="0" eaLnBrk="0" fontAlgn="base" latinLnBrk="0" hangingPunct="0">
+              <a:lnSpc>
+                <a:spcPct val="100000"/>
+              </a:lnSpc>
+              <a:spcBef>
+                <a:spcPct val="0"/>
+              </a:spcBef>
+              <a:spcAft>
+                <a:spcPct val="0"/>
+              </a:spcAft>
+              <a:buClrTx/>
+              <a:buSzTx/>
+              <a:buFontTx/>
+              <a:buChar char="•"/>
+              <a:tabLst/>
+            </a:pPr>
+            <a:r>
+              <a:rPr kumimoji="0" lang="en-US" altLang="en-US" sz="1200" b="0" i="0" u="none" strike="noStrike" cap="none" normalizeH="0" baseline="0" dirty="0">
+                <a:ln>
+                  <a:noFill/>
+                </a:ln>
+                <a:solidFill>
+                  <a:schemeClr val="tx1"/>
+                </a:solidFill>
+                <a:effectLst/>
+                <a:latin typeface="Arial" panose="020B0604020202020204" pitchFamily="34" charset="0"/>
+                <a:cs typeface="Arial" panose="020B0604020202020204" pitchFamily="34" charset="0"/>
+              </a:rPr>
+              <a:t>Supports execution of multiple threads or processes simultaneously to improve performance and responsiveness. </a:t>
+            </a:r>
+          </a:p>
+          <a:p>
+            <a:pPr marL="457200" marR="0" lvl="1" indent="0" algn="l" defTabSz="914400" rtl="0" eaLnBrk="0" fontAlgn="base" latinLnBrk="0" hangingPunct="0">
+              <a:lnSpc>
+                <a:spcPct val="100000"/>
+              </a:lnSpc>
+              <a:spcBef>
+                <a:spcPct val="0"/>
+              </a:spcBef>
+              <a:spcAft>
+                <a:spcPct val="0"/>
+              </a:spcAft>
+              <a:buClrTx/>
+              <a:buSzTx/>
+              <a:buFontTx/>
+              <a:buChar char="•"/>
+              <a:tabLst/>
+            </a:pPr>
+            <a:r>
+              <a:rPr kumimoji="0" lang="en-US" altLang="en-US" sz="1200" b="0" i="0" u="none" strike="noStrike" cap="none" normalizeH="0" baseline="0" dirty="0">
+                <a:ln>
+                  <a:noFill/>
+                </a:ln>
+                <a:solidFill>
+                  <a:schemeClr val="tx1"/>
+                </a:solidFill>
+                <a:effectLst/>
+                <a:latin typeface="Arial" panose="020B0604020202020204" pitchFamily="34" charset="0"/>
+                <a:cs typeface="Arial" panose="020B0604020202020204" pitchFamily="34" charset="0"/>
+              </a:rPr>
+              <a:t>Provides features for multi-threading and synchronization. </a:t>
+            </a:r>
+          </a:p>
+          <a:p>
+            <a:pPr marL="457200" marR="0" lvl="1" indent="0" algn="l" defTabSz="914400" rtl="0" eaLnBrk="0" fontAlgn="base" latinLnBrk="0" hangingPunct="0">
+              <a:lnSpc>
+                <a:spcPct val="100000"/>
+              </a:lnSpc>
+              <a:spcBef>
+                <a:spcPct val="0"/>
+              </a:spcBef>
+              <a:spcAft>
+                <a:spcPct val="0"/>
+              </a:spcAft>
+              <a:buClrTx/>
+              <a:buSzTx/>
+              <a:buFontTx/>
+              <a:buChar char="•"/>
+              <a:tabLst/>
+            </a:pPr>
+            <a:r>
+              <a:rPr kumimoji="0" lang="en-US" altLang="en-US" sz="1200" b="0" i="0" u="none" strike="noStrike" cap="none" normalizeH="0" baseline="0" dirty="0">
+                <a:ln>
+                  <a:noFill/>
+                </a:ln>
+                <a:solidFill>
+                  <a:schemeClr val="tx1"/>
+                </a:solidFill>
+                <a:effectLst/>
+                <a:latin typeface="Arial" panose="020B0604020202020204" pitchFamily="34" charset="0"/>
+                <a:cs typeface="Arial" panose="020B0604020202020204" pitchFamily="34" charset="0"/>
+              </a:rPr>
+              <a:t>Example: std::thread, std::mutex, and other concurrency utilities from the C++ Standard Library. </a:t>
+            </a:r>
           </a:p>
         </p:txBody>
       </p:sp>
     </p:spTree>
     <p:extLst>
       <p:ext uri="{BB962C8B-B14F-4D97-AF65-F5344CB8AC3E}">
-        <p14:creationId xmlns:p14="http://schemas.microsoft.com/office/powerpoint/2010/main" val="1022999529"/>
+        <p14:creationId xmlns:p14="http://schemas.microsoft.com/office/powerpoint/2010/main" val="3507904277"/>
+      </p:ext>
+    </p:extLst>
+  </p:cSld>
+  <p:clrMapOvr>
+    <a:masterClrMapping/>
+  </p:clrMapOvr>
+</p:sld>
+</file>
+
+<file path=ppt/slides/slide6.xml><?xml version="1.0" encoding="utf-8"?>
+<p:sld xmlns:a="http://schemas.openxmlformats.org/drawingml/2006/main" xmlns:r="http://schemas.openxmlformats.org/officeDocument/2006/relationships" xmlns:p="http://schemas.openxmlformats.org/presentationml/2006/main">
+  <p:cSld>
+    <p:spTree>
+      <p:nvGrpSpPr>
+        <p:cNvPr id="1" name=""/>
+        <p:cNvGrpSpPr/>
+        <p:nvPr/>
+      </p:nvGrpSpPr>
+      <p:grpSpPr>
+        <a:xfrm>
+          <a:off x="0" y="0"/>
+          <a:ext cx="0" cy="0"/>
+          <a:chOff x="0" y="0"/>
+          <a:chExt cx="0" cy="0"/>
+        </a:xfrm>
+      </p:grpSpPr>
+      <p:sp>
+        <p:nvSpPr>
+          <p:cNvPr id="2" name="Title 1">
+            <a:extLst>
+              <a:ext uri="{FF2B5EF4-FFF2-40B4-BE49-F238E27FC236}">
+                <a16:creationId xmlns:a16="http://schemas.microsoft.com/office/drawing/2014/main" id="{0D5E82AD-F9E9-4671-6974-69798A9944ED}"/>
+              </a:ext>
+            </a:extLst>
+          </p:cNvPr>
+          <p:cNvSpPr>
+            <a:spLocks noGrp="1"/>
+          </p:cNvSpPr>
+          <p:nvPr>
+            <p:ph type="title"/>
+          </p:nvPr>
+        </p:nvSpPr>
+        <p:spPr>
+          <a:xfrm>
+            <a:off x="838200" y="365125"/>
+            <a:ext cx="10515600" cy="442743"/>
+          </a:xfrm>
+        </p:spPr>
+        <p:txBody>
+          <a:bodyPr>
+            <a:normAutofit fontScale="90000"/>
+          </a:bodyPr>
+          <a:lstStyle/>
+          <a:p>
+            <a:r>
+              <a:rPr kumimoji="0" lang="en-US" altLang="en-US" sz="4400" b="1" i="0" u="none" strike="noStrike" cap="none" normalizeH="0" baseline="0" dirty="0">
+                <a:ln>
+                  <a:noFill/>
+                </a:ln>
+                <a:solidFill>
+                  <a:schemeClr val="tx1"/>
+                </a:solidFill>
+                <a:effectLst/>
+                <a:latin typeface="Arial" panose="020B0604020202020204" pitchFamily="34" charset="0"/>
+                <a:cs typeface="Arial" panose="020B0604020202020204" pitchFamily="34" charset="0"/>
+              </a:rPr>
+              <a:t>Object-Oriented Programming Concept</a:t>
+            </a:r>
+            <a:endParaRPr lang="en-US" dirty="0"/>
+          </a:p>
+        </p:txBody>
+      </p:sp>
+      <p:sp>
+        <p:nvSpPr>
+          <p:cNvPr id="6" name="Rectangle 3">
+            <a:extLst>
+              <a:ext uri="{FF2B5EF4-FFF2-40B4-BE49-F238E27FC236}">
+                <a16:creationId xmlns:a16="http://schemas.microsoft.com/office/drawing/2014/main" id="{C901006B-56DD-7BC4-8F33-C4E74D41D7E6}"/>
+              </a:ext>
+            </a:extLst>
+          </p:cNvPr>
+          <p:cNvSpPr>
+            <a:spLocks noGrp="1" noChangeArrowheads="1"/>
+          </p:cNvSpPr>
+          <p:nvPr>
+            <p:ph idx="1"/>
+          </p:nvPr>
+        </p:nvSpPr>
+        <p:spPr bwMode="auto">
+          <a:xfrm>
+            <a:off x="838200" y="1026119"/>
+            <a:ext cx="10634643" cy="4339650"/>
+          </a:xfrm>
+          <a:prstGeom prst="rect">
+            <a:avLst/>
+          </a:prstGeom>
+          <a:noFill/>
+          <a:ln>
+            <a:noFill/>
+          </a:ln>
+          <a:effectLst/>
+          <a:extLst>
+            <a:ext uri="{909E8E84-426E-40DD-AFC4-6F175D3DCCD1}">
+              <a14:hiddenFill xmlns:a14="http://schemas.microsoft.com/office/drawing/2010/main">
+                <a:solidFill>
+                  <a:schemeClr val="accent1"/>
+                </a:solidFill>
+              </a14:hiddenFill>
+            </a:ext>
+            <a:ext uri="{91240B29-F687-4F45-9708-019B960494DF}">
+              <a14:hiddenLine xmlns:a14="http://schemas.microsoft.com/office/drawing/2010/main" w="9525">
+                <a:solidFill>
+                  <a:schemeClr val="tx1"/>
+                </a:solidFill>
+                <a:miter lim="800000"/>
+                <a:headEnd/>
+                <a:tailEnd/>
+              </a14:hiddenLine>
+            </a:ext>
+            <a:ext uri="{AF507438-7753-43E0-B8FC-AC1667EBCBE1}">
+              <a14:hiddenEffects xmlns:a14="http://schemas.microsoft.com/office/drawing/2010/main">
+                <a:effectLst>
+                  <a:outerShdw dist="35921" dir="2700000" algn="ctr" rotWithShape="0">
+                    <a:schemeClr val="bg2"/>
+                  </a:outerShdw>
+                </a:effectLst>
+              </a14:hiddenEffects>
+            </a:ext>
+          </a:extLst>
+        </p:spPr>
+        <p:txBody>
+          <a:bodyPr vert="horz" wrap="none" lIns="91440" tIns="45720" rIns="91440" bIns="45720" numCol="1" anchor="ctr" anchorCtr="0" compatLnSpc="1">
+            <a:prstTxWarp prst="textNoShape">
+              <a:avLst/>
+            </a:prstTxWarp>
+            <a:spAutoFit/>
+          </a:bodyPr>
+          <a:lstStyle/>
+          <a:p>
+            <a:pPr marL="0" marR="0" lvl="0" indent="0" algn="l" defTabSz="914400" rtl="0" eaLnBrk="0" fontAlgn="base" latinLnBrk="0" hangingPunct="0">
+              <a:lnSpc>
+                <a:spcPct val="100000"/>
+              </a:lnSpc>
+              <a:spcBef>
+                <a:spcPct val="0"/>
+              </a:spcBef>
+              <a:spcAft>
+                <a:spcPct val="0"/>
+              </a:spcAft>
+              <a:buClrTx/>
+              <a:buSzTx/>
+              <a:buFontTx/>
+              <a:buChar char="•"/>
+              <a:tabLst/>
+            </a:pPr>
+            <a:r>
+              <a:rPr kumimoji="0" lang="en-US" altLang="en-US" sz="1800" b="1" i="0" u="none" strike="noStrike" cap="none" normalizeH="0" baseline="0" dirty="0">
+                <a:ln>
+                  <a:noFill/>
+                </a:ln>
+                <a:solidFill>
+                  <a:schemeClr val="tx1"/>
+                </a:solidFill>
+                <a:effectLst/>
+                <a:latin typeface="Arial" panose="020B0604020202020204" pitchFamily="34" charset="0"/>
+              </a:rPr>
+              <a:t>Class</a:t>
+            </a:r>
+            <a:r>
+              <a:rPr kumimoji="0" lang="en-US" altLang="en-US" sz="1800" b="0" i="0" u="none" strike="noStrike" cap="none" normalizeH="0" baseline="0" dirty="0">
+                <a:ln>
+                  <a:noFill/>
+                </a:ln>
+                <a:solidFill>
+                  <a:schemeClr val="tx1"/>
+                </a:solidFill>
+                <a:effectLst/>
+                <a:latin typeface="Arial" panose="020B0604020202020204" pitchFamily="34" charset="0"/>
+              </a:rPr>
+              <a:t>: </a:t>
+            </a:r>
+          </a:p>
+          <a:p>
+            <a:pPr marL="457200" lvl="1" indent="0" eaLnBrk="0" fontAlgn="base" hangingPunct="0">
+              <a:lnSpc>
+                <a:spcPct val="100000"/>
+              </a:lnSpc>
+              <a:spcBef>
+                <a:spcPct val="0"/>
+              </a:spcBef>
+              <a:spcAft>
+                <a:spcPct val="0"/>
+              </a:spcAft>
+              <a:buFontTx/>
+              <a:buChar char="•"/>
+            </a:pPr>
+            <a:r>
+              <a:rPr kumimoji="0" lang="en-US" altLang="en-US" sz="1400" b="0" i="0" u="none" strike="noStrike" cap="none" normalizeH="0" baseline="0" dirty="0">
+                <a:ln>
+                  <a:noFill/>
+                </a:ln>
+                <a:solidFill>
+                  <a:schemeClr val="tx1"/>
+                </a:solidFill>
+                <a:effectLst/>
+                <a:latin typeface="Arial" panose="020B0604020202020204" pitchFamily="34" charset="0"/>
+              </a:rPr>
+              <a:t>A blueprint or template for creating objects. It defines a set of attributes and methods that the created objects will have.</a:t>
+            </a:r>
+          </a:p>
+          <a:p>
+            <a:pPr marL="0" marR="0" lvl="0" indent="0" algn="l" defTabSz="914400" rtl="0" eaLnBrk="0" fontAlgn="base" latinLnBrk="0" hangingPunct="0">
+              <a:lnSpc>
+                <a:spcPct val="100000"/>
+              </a:lnSpc>
+              <a:spcBef>
+                <a:spcPct val="0"/>
+              </a:spcBef>
+              <a:spcAft>
+                <a:spcPct val="0"/>
+              </a:spcAft>
+              <a:buClrTx/>
+              <a:buSzTx/>
+              <a:buFontTx/>
+              <a:buChar char="•"/>
+              <a:tabLst/>
+            </a:pPr>
+            <a:r>
+              <a:rPr kumimoji="0" lang="en-US" altLang="en-US" sz="1800" b="1" i="0" u="none" strike="noStrike" cap="none" normalizeH="0" baseline="0" dirty="0">
+                <a:ln>
+                  <a:noFill/>
+                </a:ln>
+                <a:solidFill>
+                  <a:schemeClr val="tx1"/>
+                </a:solidFill>
+                <a:effectLst/>
+                <a:latin typeface="Arial" panose="020B0604020202020204" pitchFamily="34" charset="0"/>
+              </a:rPr>
+              <a:t>Object</a:t>
+            </a:r>
+            <a:r>
+              <a:rPr kumimoji="0" lang="en-US" altLang="en-US" sz="1800" b="0" i="0" u="none" strike="noStrike" cap="none" normalizeH="0" baseline="0" dirty="0">
+                <a:ln>
+                  <a:noFill/>
+                </a:ln>
+                <a:solidFill>
+                  <a:schemeClr val="tx1"/>
+                </a:solidFill>
+                <a:effectLst/>
+                <a:latin typeface="Arial" panose="020B0604020202020204" pitchFamily="34" charset="0"/>
+              </a:rPr>
+              <a:t>: </a:t>
+            </a:r>
+          </a:p>
+          <a:p>
+            <a:pPr marL="457200" lvl="1" indent="0" eaLnBrk="0" fontAlgn="base" hangingPunct="0">
+              <a:lnSpc>
+                <a:spcPct val="100000"/>
+              </a:lnSpc>
+              <a:spcBef>
+                <a:spcPct val="0"/>
+              </a:spcBef>
+              <a:spcAft>
+                <a:spcPct val="0"/>
+              </a:spcAft>
+              <a:buFontTx/>
+              <a:buChar char="•"/>
+            </a:pPr>
+            <a:r>
+              <a:rPr kumimoji="0" lang="en-US" altLang="en-US" sz="1400" b="0" i="0" u="none" strike="noStrike" cap="none" normalizeH="0" baseline="0" dirty="0">
+                <a:ln>
+                  <a:noFill/>
+                </a:ln>
+                <a:solidFill>
+                  <a:schemeClr val="tx1"/>
+                </a:solidFill>
+                <a:effectLst/>
+                <a:latin typeface="Arial" panose="020B0604020202020204" pitchFamily="34" charset="0"/>
+              </a:rPr>
+              <a:t>An instance of a class. It is a concrete entity based on the class blueprint, containing real values for the class's attributes.</a:t>
+            </a:r>
+          </a:p>
+          <a:p>
+            <a:pPr marL="0" marR="0" lvl="0" indent="0" algn="l" defTabSz="914400" rtl="0" eaLnBrk="0" fontAlgn="base" latinLnBrk="0" hangingPunct="0">
+              <a:lnSpc>
+                <a:spcPct val="100000"/>
+              </a:lnSpc>
+              <a:spcBef>
+                <a:spcPct val="0"/>
+              </a:spcBef>
+              <a:spcAft>
+                <a:spcPct val="0"/>
+              </a:spcAft>
+              <a:buClrTx/>
+              <a:buSzTx/>
+              <a:buFontTx/>
+              <a:buChar char="•"/>
+              <a:tabLst/>
+            </a:pPr>
+            <a:r>
+              <a:rPr kumimoji="0" lang="en-US" altLang="en-US" sz="1800" b="1" i="0" u="none" strike="noStrike" cap="none" normalizeH="0" baseline="0" dirty="0">
+                <a:ln>
+                  <a:noFill/>
+                </a:ln>
+                <a:solidFill>
+                  <a:schemeClr val="tx1"/>
+                </a:solidFill>
+                <a:effectLst/>
+                <a:latin typeface="Arial" panose="020B0604020202020204" pitchFamily="34" charset="0"/>
+              </a:rPr>
+              <a:t>Encapsulation</a:t>
+            </a:r>
+            <a:r>
+              <a:rPr kumimoji="0" lang="en-US" altLang="en-US" sz="1800" b="0" i="0" u="none" strike="noStrike" cap="none" normalizeH="0" baseline="0" dirty="0">
+                <a:ln>
+                  <a:noFill/>
+                </a:ln>
+                <a:solidFill>
+                  <a:schemeClr val="tx1"/>
+                </a:solidFill>
+                <a:effectLst/>
+                <a:latin typeface="Arial" panose="020B0604020202020204" pitchFamily="34" charset="0"/>
+              </a:rPr>
+              <a:t>: </a:t>
+            </a:r>
+          </a:p>
+          <a:p>
+            <a:pPr marL="457200" lvl="1" indent="0" eaLnBrk="0" fontAlgn="base" hangingPunct="0">
+              <a:lnSpc>
+                <a:spcPct val="100000"/>
+              </a:lnSpc>
+              <a:spcBef>
+                <a:spcPct val="0"/>
+              </a:spcBef>
+              <a:spcAft>
+                <a:spcPct val="0"/>
+              </a:spcAft>
+              <a:buFontTx/>
+              <a:buChar char="•"/>
+            </a:pPr>
+            <a:r>
+              <a:rPr kumimoji="0" lang="en-US" altLang="en-US" sz="1400" b="0" i="0" u="none" strike="noStrike" cap="none" normalizeH="0" baseline="0" dirty="0">
+                <a:ln>
+                  <a:noFill/>
+                </a:ln>
+                <a:solidFill>
+                  <a:schemeClr val="tx1"/>
+                </a:solidFill>
+                <a:effectLst/>
+                <a:latin typeface="Arial" panose="020B0604020202020204" pitchFamily="34" charset="0"/>
+              </a:rPr>
+              <a:t>The bundling of data (attributes) and methods (functions) that operate on the data into a single unit or class. </a:t>
+            </a:r>
+          </a:p>
+          <a:p>
+            <a:pPr marL="457200" lvl="1" indent="0" eaLnBrk="0" fontAlgn="base" hangingPunct="0">
+              <a:lnSpc>
+                <a:spcPct val="100000"/>
+              </a:lnSpc>
+              <a:spcBef>
+                <a:spcPct val="0"/>
+              </a:spcBef>
+              <a:spcAft>
+                <a:spcPct val="0"/>
+              </a:spcAft>
+              <a:buFontTx/>
+              <a:buChar char="•"/>
+            </a:pPr>
+            <a:r>
+              <a:rPr kumimoji="0" lang="en-US" altLang="en-US" sz="1400" b="0" i="0" u="none" strike="noStrike" cap="none" normalizeH="0" baseline="0" dirty="0">
+                <a:ln>
+                  <a:noFill/>
+                </a:ln>
+                <a:solidFill>
+                  <a:schemeClr val="tx1"/>
+                </a:solidFill>
+                <a:effectLst/>
+                <a:latin typeface="Arial" panose="020B0604020202020204" pitchFamily="34" charset="0"/>
+              </a:rPr>
+              <a:t>It often involves restricting direct access to some of the object’s components, which is a means of preventing unintended </a:t>
+            </a:r>
+          </a:p>
+          <a:p>
+            <a:pPr marL="457200" lvl="1" indent="0" eaLnBrk="0" fontAlgn="base" hangingPunct="0">
+              <a:lnSpc>
+                <a:spcPct val="100000"/>
+              </a:lnSpc>
+              <a:spcBef>
+                <a:spcPct val="0"/>
+              </a:spcBef>
+              <a:spcAft>
+                <a:spcPct val="0"/>
+              </a:spcAft>
+              <a:buNone/>
+            </a:pPr>
+            <a:r>
+              <a:rPr lang="en-US" altLang="en-US" sz="1400" dirty="0">
+                <a:latin typeface="Arial" panose="020B0604020202020204" pitchFamily="34" charset="0"/>
+              </a:rPr>
+              <a:t> </a:t>
+            </a:r>
+            <a:r>
+              <a:rPr kumimoji="0" lang="en-US" altLang="en-US" sz="1400" b="0" i="0" u="none" strike="noStrike" cap="none" normalizeH="0" baseline="0" dirty="0">
+                <a:ln>
+                  <a:noFill/>
+                </a:ln>
+                <a:solidFill>
+                  <a:schemeClr val="tx1"/>
+                </a:solidFill>
+                <a:effectLst/>
+                <a:latin typeface="Arial" panose="020B0604020202020204" pitchFamily="34" charset="0"/>
+              </a:rPr>
+              <a:t>interference and misuse.</a:t>
+            </a:r>
+          </a:p>
+          <a:p>
+            <a:pPr marL="0" marR="0" lvl="0" indent="0" algn="l" defTabSz="914400" rtl="0" eaLnBrk="0" fontAlgn="base" latinLnBrk="0" hangingPunct="0">
+              <a:lnSpc>
+                <a:spcPct val="100000"/>
+              </a:lnSpc>
+              <a:spcBef>
+                <a:spcPct val="0"/>
+              </a:spcBef>
+              <a:spcAft>
+                <a:spcPct val="0"/>
+              </a:spcAft>
+              <a:buClrTx/>
+              <a:buSzTx/>
+              <a:buFontTx/>
+              <a:buChar char="•"/>
+              <a:tabLst/>
+            </a:pPr>
+            <a:r>
+              <a:rPr kumimoji="0" lang="en-US" altLang="en-US" sz="1800" b="1" i="0" u="none" strike="noStrike" cap="none" normalizeH="0" baseline="0" dirty="0">
+                <a:ln>
+                  <a:noFill/>
+                </a:ln>
+                <a:solidFill>
+                  <a:schemeClr val="tx1"/>
+                </a:solidFill>
+                <a:effectLst/>
+                <a:latin typeface="Arial" panose="020B0604020202020204" pitchFamily="34" charset="0"/>
+              </a:rPr>
+              <a:t>Abstraction</a:t>
+            </a:r>
+            <a:r>
+              <a:rPr kumimoji="0" lang="en-US" altLang="en-US" sz="1800" b="0" i="0" u="none" strike="noStrike" cap="none" normalizeH="0" baseline="0" dirty="0">
+                <a:ln>
+                  <a:noFill/>
+                </a:ln>
+                <a:solidFill>
+                  <a:schemeClr val="tx1"/>
+                </a:solidFill>
+                <a:effectLst/>
+                <a:latin typeface="Arial" panose="020B0604020202020204" pitchFamily="34" charset="0"/>
+              </a:rPr>
+              <a:t>: </a:t>
+            </a:r>
+          </a:p>
+          <a:p>
+            <a:pPr marL="457200" lvl="1" indent="0" eaLnBrk="0" fontAlgn="base" hangingPunct="0">
+              <a:lnSpc>
+                <a:spcPct val="100000"/>
+              </a:lnSpc>
+              <a:spcBef>
+                <a:spcPct val="0"/>
+              </a:spcBef>
+              <a:spcAft>
+                <a:spcPct val="0"/>
+              </a:spcAft>
+              <a:buFontTx/>
+              <a:buChar char="•"/>
+            </a:pPr>
+            <a:r>
+              <a:rPr kumimoji="0" lang="en-US" altLang="en-US" sz="1400" b="0" i="0" u="none" strike="noStrike" cap="none" normalizeH="0" baseline="0" dirty="0">
+                <a:ln>
+                  <a:noFill/>
+                </a:ln>
+                <a:solidFill>
+                  <a:schemeClr val="tx1"/>
+                </a:solidFill>
+                <a:effectLst/>
+                <a:latin typeface="Arial" panose="020B0604020202020204" pitchFamily="34" charset="0"/>
+              </a:rPr>
+              <a:t>The concept of hiding the complex implementation details and showing only the necessary features of the object. </a:t>
+            </a:r>
+          </a:p>
+          <a:p>
+            <a:pPr marL="457200" lvl="1" indent="0" eaLnBrk="0" fontAlgn="base" hangingPunct="0">
+              <a:lnSpc>
+                <a:spcPct val="100000"/>
+              </a:lnSpc>
+              <a:spcBef>
+                <a:spcPct val="0"/>
+              </a:spcBef>
+              <a:spcAft>
+                <a:spcPct val="0"/>
+              </a:spcAft>
+              <a:buFontTx/>
+              <a:buChar char="•"/>
+            </a:pPr>
+            <a:r>
+              <a:rPr kumimoji="0" lang="en-US" altLang="en-US" sz="1400" b="0" i="0" u="none" strike="noStrike" cap="none" normalizeH="0" baseline="0" dirty="0">
+                <a:ln>
+                  <a:noFill/>
+                </a:ln>
+                <a:solidFill>
+                  <a:schemeClr val="tx1"/>
+                </a:solidFill>
+                <a:effectLst/>
+                <a:latin typeface="Arial" panose="020B0604020202020204" pitchFamily="34" charset="0"/>
+              </a:rPr>
+              <a:t>It helps in reducing programming complexity and effort.</a:t>
+            </a:r>
+          </a:p>
+          <a:p>
+            <a:pPr marL="0" marR="0" lvl="0" indent="0" algn="l" defTabSz="914400" rtl="0" eaLnBrk="0" fontAlgn="base" latinLnBrk="0" hangingPunct="0">
+              <a:lnSpc>
+                <a:spcPct val="100000"/>
+              </a:lnSpc>
+              <a:spcBef>
+                <a:spcPct val="0"/>
+              </a:spcBef>
+              <a:spcAft>
+                <a:spcPct val="0"/>
+              </a:spcAft>
+              <a:buClrTx/>
+              <a:buSzTx/>
+              <a:buFontTx/>
+              <a:buChar char="•"/>
+              <a:tabLst/>
+            </a:pPr>
+            <a:r>
+              <a:rPr kumimoji="0" lang="en-US" altLang="en-US" sz="1800" b="1" i="0" u="none" strike="noStrike" cap="none" normalizeH="0" baseline="0" dirty="0">
+                <a:ln>
+                  <a:noFill/>
+                </a:ln>
+                <a:solidFill>
+                  <a:schemeClr val="tx1"/>
+                </a:solidFill>
+                <a:effectLst/>
+                <a:latin typeface="Arial" panose="020B0604020202020204" pitchFamily="34" charset="0"/>
+              </a:rPr>
+              <a:t>Inheritance</a:t>
+            </a:r>
+            <a:r>
+              <a:rPr kumimoji="0" lang="en-US" altLang="en-US" sz="1800" b="0" i="0" u="none" strike="noStrike" cap="none" normalizeH="0" baseline="0" dirty="0">
+                <a:ln>
+                  <a:noFill/>
+                </a:ln>
+                <a:solidFill>
+                  <a:schemeClr val="tx1"/>
+                </a:solidFill>
+                <a:effectLst/>
+                <a:latin typeface="Arial" panose="020B0604020202020204" pitchFamily="34" charset="0"/>
+              </a:rPr>
+              <a:t>: </a:t>
+            </a:r>
+          </a:p>
+          <a:p>
+            <a:pPr marL="457200" lvl="1" indent="0" eaLnBrk="0" fontAlgn="base" hangingPunct="0">
+              <a:lnSpc>
+                <a:spcPct val="100000"/>
+              </a:lnSpc>
+              <a:spcBef>
+                <a:spcPct val="0"/>
+              </a:spcBef>
+              <a:spcAft>
+                <a:spcPct val="0"/>
+              </a:spcAft>
+              <a:buFontTx/>
+              <a:buChar char="•"/>
+            </a:pPr>
+            <a:r>
+              <a:rPr kumimoji="0" lang="en-US" altLang="en-US" sz="1400" b="0" i="0" u="none" strike="noStrike" cap="none" normalizeH="0" baseline="0" dirty="0">
+                <a:ln>
+                  <a:noFill/>
+                </a:ln>
+                <a:solidFill>
+                  <a:schemeClr val="tx1"/>
+                </a:solidFill>
+                <a:effectLst/>
+                <a:latin typeface="Arial" panose="020B0604020202020204" pitchFamily="34" charset="0"/>
+              </a:rPr>
+              <a:t>A mechanism where a new class, called a subclass, is derived from an existing class, called a superclass. </a:t>
+            </a:r>
+          </a:p>
+          <a:p>
+            <a:pPr marL="457200" lvl="1" indent="0" eaLnBrk="0" fontAlgn="base" hangingPunct="0">
+              <a:lnSpc>
+                <a:spcPct val="100000"/>
+              </a:lnSpc>
+              <a:spcBef>
+                <a:spcPct val="0"/>
+              </a:spcBef>
+              <a:spcAft>
+                <a:spcPct val="0"/>
+              </a:spcAft>
+              <a:buFontTx/>
+              <a:buChar char="•"/>
+            </a:pPr>
+            <a:r>
+              <a:rPr kumimoji="0" lang="en-US" altLang="en-US" sz="1400" b="0" i="0" u="none" strike="noStrike" cap="none" normalizeH="0" baseline="0" dirty="0">
+                <a:ln>
+                  <a:noFill/>
+                </a:ln>
+                <a:solidFill>
+                  <a:schemeClr val="tx1"/>
+                </a:solidFill>
+                <a:effectLst/>
+                <a:latin typeface="Arial" panose="020B0604020202020204" pitchFamily="34" charset="0"/>
+              </a:rPr>
+              <a:t>The subclass inherits attributes and methods from the superclass, enabling code reusability and the creation of a hierarchical </a:t>
+            </a:r>
+          </a:p>
+          <a:p>
+            <a:pPr marL="457200" lvl="1" indent="0" eaLnBrk="0" fontAlgn="base" hangingPunct="0">
+              <a:lnSpc>
+                <a:spcPct val="100000"/>
+              </a:lnSpc>
+              <a:spcBef>
+                <a:spcPct val="0"/>
+              </a:spcBef>
+              <a:spcAft>
+                <a:spcPct val="0"/>
+              </a:spcAft>
+              <a:buNone/>
+            </a:pPr>
+            <a:r>
+              <a:rPr kumimoji="0" lang="en-US" altLang="en-US" sz="1400" b="0" i="0" u="none" strike="noStrike" cap="none" normalizeH="0" baseline="0" dirty="0">
+                <a:ln>
+                  <a:noFill/>
+                </a:ln>
+                <a:solidFill>
+                  <a:schemeClr val="tx1"/>
+                </a:solidFill>
+                <a:effectLst/>
+                <a:latin typeface="Arial" panose="020B0604020202020204" pitchFamily="34" charset="0"/>
+              </a:rPr>
+              <a:t> relationship between classes.</a:t>
+            </a:r>
+          </a:p>
+          <a:p>
+            <a:pPr marL="0" marR="0" lvl="0" indent="0" algn="l" defTabSz="914400" rtl="0" eaLnBrk="0" fontAlgn="base" latinLnBrk="0" hangingPunct="0">
+              <a:lnSpc>
+                <a:spcPct val="100000"/>
+              </a:lnSpc>
+              <a:spcBef>
+                <a:spcPct val="0"/>
+              </a:spcBef>
+              <a:spcAft>
+                <a:spcPct val="0"/>
+              </a:spcAft>
+              <a:buClrTx/>
+              <a:buSzTx/>
+              <a:buFontTx/>
+              <a:buChar char="•"/>
+              <a:tabLst/>
+            </a:pPr>
+            <a:r>
+              <a:rPr kumimoji="0" lang="en-US" altLang="en-US" sz="1800" b="1" i="0" u="none" strike="noStrike" cap="none" normalizeH="0" baseline="0" dirty="0">
+                <a:ln>
+                  <a:noFill/>
+                </a:ln>
+                <a:solidFill>
+                  <a:schemeClr val="tx1"/>
+                </a:solidFill>
+                <a:effectLst/>
+                <a:latin typeface="Arial" panose="020B0604020202020204" pitchFamily="34" charset="0"/>
+              </a:rPr>
+              <a:t>Polymorphism</a:t>
+            </a:r>
+            <a:r>
+              <a:rPr kumimoji="0" lang="en-US" altLang="en-US" sz="1800" b="0" i="0" u="none" strike="noStrike" cap="none" normalizeH="0" baseline="0" dirty="0">
+                <a:ln>
+                  <a:noFill/>
+                </a:ln>
+                <a:solidFill>
+                  <a:schemeClr val="tx1"/>
+                </a:solidFill>
+                <a:effectLst/>
+                <a:latin typeface="Arial" panose="020B0604020202020204" pitchFamily="34" charset="0"/>
+              </a:rPr>
+              <a:t>: </a:t>
+            </a:r>
+          </a:p>
+          <a:p>
+            <a:pPr marL="457200" lvl="1" indent="0" eaLnBrk="0" fontAlgn="base" hangingPunct="0">
+              <a:lnSpc>
+                <a:spcPct val="100000"/>
+              </a:lnSpc>
+              <a:spcBef>
+                <a:spcPct val="0"/>
+              </a:spcBef>
+              <a:spcAft>
+                <a:spcPct val="0"/>
+              </a:spcAft>
+              <a:buFontTx/>
+              <a:buChar char="•"/>
+            </a:pPr>
+            <a:r>
+              <a:rPr kumimoji="0" lang="en-US" altLang="en-US" sz="1400" b="0" i="0" u="none" strike="noStrike" cap="none" normalizeH="0" baseline="0" dirty="0">
+                <a:ln>
+                  <a:noFill/>
+                </a:ln>
+                <a:solidFill>
+                  <a:schemeClr val="tx1"/>
+                </a:solidFill>
+                <a:effectLst/>
+                <a:latin typeface="Arial" panose="020B0604020202020204" pitchFamily="34" charset="0"/>
+              </a:rPr>
+              <a:t>The ability to present the same interface for different underlying forms (data types). </a:t>
+            </a:r>
+          </a:p>
+          <a:p>
+            <a:pPr marL="457200" lvl="1" indent="0" eaLnBrk="0" fontAlgn="base" hangingPunct="0">
+              <a:lnSpc>
+                <a:spcPct val="100000"/>
+              </a:lnSpc>
+              <a:spcBef>
+                <a:spcPct val="0"/>
+              </a:spcBef>
+              <a:spcAft>
+                <a:spcPct val="0"/>
+              </a:spcAft>
+              <a:buFontTx/>
+              <a:buChar char="•"/>
+            </a:pPr>
+            <a:r>
+              <a:rPr kumimoji="0" lang="en-US" altLang="en-US" sz="1400" b="0" i="0" u="none" strike="noStrike" cap="none" normalizeH="0" baseline="0" dirty="0">
+                <a:ln>
+                  <a:noFill/>
+                </a:ln>
+                <a:solidFill>
+                  <a:schemeClr val="tx1"/>
+                </a:solidFill>
+                <a:effectLst/>
+                <a:latin typeface="Arial" panose="020B0604020202020204" pitchFamily="34" charset="0"/>
+              </a:rPr>
+              <a:t>It allows methods to do different things based on the object it is acting upon, even though they share the same name</a:t>
+            </a:r>
+          </a:p>
+        </p:txBody>
+      </p:sp>
+    </p:spTree>
+    <p:extLst>
+      <p:ext uri="{BB962C8B-B14F-4D97-AF65-F5344CB8AC3E}">
+        <p14:creationId xmlns:p14="http://schemas.microsoft.com/office/powerpoint/2010/main" val="1356626027"/>
       </p:ext>
     </p:extLst>
   </p:cSld>

</xml_diff>